<commit_message>
Edit presentation: Refer to PDF instead of PNG image
</commit_message>
<xml_diff>
--- a/report/Project Report.pptx
+++ b/report/Project Report.pptx
@@ -6428,7 +6428,7 @@
         <p:spPr/>
         <p:txBody>
           <a:bodyPr>
-            <a:normAutofit/>
+            <a:normAutofit lnSpcReduction="10000"/>
           </a:bodyPr>
           <a:lstStyle/>
           <a:p>
@@ -8045,11 +8045,15 @@
               <a:rPr lang="en-US" sz="2400" cap="none" dirty="0" smtClean="0">
                 <a:hlinkClick r:id="rId2" action="ppaction://hlinkfile"/>
               </a:rPr>
-              <a:t>Refer </a:t>
+              <a:t>Refer</a:t>
             </a:r>
             <a:r>
               <a:rPr lang="en-US" sz="2400" cap="none" dirty="0" smtClean="0"/>
-              <a:t>to UML class diagram for more details</a:t>
+              <a:t> to </a:t>
+            </a:r>
+            <a:r>
+              <a:rPr lang="en-US" sz="2400" cap="none" dirty="0" smtClean="0"/>
+              <a:t>UML class diagram for more details</a:t>
             </a:r>
             <a:endParaRPr lang="vi-VN" sz="2400" cap="none" dirty="0"/>
           </a:p>
@@ -8121,7 +8125,11 @@
           <a:p>
             <a:r>
               <a:rPr lang="en-US" dirty="0" smtClean="0"/>
-              <a:t>Group member</a:t>
+              <a:t>Group </a:t>
+            </a:r>
+            <a:r>
+              <a:rPr lang="en-US" dirty="0" smtClean="0"/>
+              <a:t>members</a:t>
             </a:r>
             <a:endParaRPr lang="en-US" dirty="0"/>
           </a:p>
@@ -8136,7 +8144,7 @@
         <p:spPr>
           <a:xfrm>
             <a:off x="4387708" y="2884867"/>
-            <a:ext cx="3713103" cy="3108543"/>
+            <a:ext cx="3713103" cy="1384995"/>
           </a:xfrm>
           <a:prstGeom prst="rect">
             <a:avLst/>
@@ -8154,44 +8162,12 @@
               <a:buChar char="•"/>
             </a:pPr>
             <a:r>
-              <a:rPr lang="en-US" sz="2800" dirty="0" err="1">
+              <a:rPr lang="vi-VN" sz="2800" dirty="0" smtClean="0">
                 <a:latin typeface="Times New Roman" panose="02020603050405020304" pitchFamily="18" charset="0"/>
                 <a:cs typeface="Times New Roman" panose="02020603050405020304" pitchFamily="18" charset="0"/>
               </a:rPr>
-              <a:t>Hoàng</a:t>
-            </a:r>
-            <a:r>
-              <a:rPr lang="en-US" sz="2800" dirty="0">
-                <a:latin typeface="Times New Roman" panose="02020603050405020304" pitchFamily="18" charset="0"/>
-                <a:cs typeface="Times New Roman" panose="02020603050405020304" pitchFamily="18" charset="0"/>
-              </a:rPr>
-              <a:t> </a:t>
-            </a:r>
-            <a:r>
-              <a:rPr lang="en-US" sz="2800" dirty="0" err="1">
-                <a:latin typeface="Times New Roman" panose="02020603050405020304" pitchFamily="18" charset="0"/>
-                <a:cs typeface="Times New Roman" panose="02020603050405020304" pitchFamily="18" charset="0"/>
-              </a:rPr>
-              <a:t>Thị</a:t>
-            </a:r>
-            <a:r>
-              <a:rPr lang="en-US" sz="2800" dirty="0">
-                <a:latin typeface="Times New Roman" panose="02020603050405020304" pitchFamily="18" charset="0"/>
-                <a:cs typeface="Times New Roman" panose="02020603050405020304" pitchFamily="18" charset="0"/>
-              </a:rPr>
-              <a:t> </a:t>
-            </a:r>
-            <a:r>
-              <a:rPr lang="en-US" sz="2800" dirty="0" err="1">
-                <a:latin typeface="Times New Roman" panose="02020603050405020304" pitchFamily="18" charset="0"/>
-                <a:cs typeface="Times New Roman" panose="02020603050405020304" pitchFamily="18" charset="0"/>
-              </a:rPr>
-              <a:t>Nhung</a:t>
-            </a:r>
-            <a:endParaRPr lang="en-US" sz="2800" dirty="0">
-              <a:latin typeface="Times New Roman" panose="02020603050405020304" pitchFamily="18" charset="0"/>
-              <a:cs typeface="Times New Roman" panose="02020603050405020304" pitchFamily="18" charset="0"/>
-            </a:endParaRPr>
+              <a:t>Hoàng Thị Nhung</a:t>
+            </a:r>
           </a:p>
           <a:p>
             <a:pPr marL="285750" indent="-285750">
@@ -8199,18 +8175,11 @@
               <a:buChar char="•"/>
             </a:pPr>
             <a:r>
-              <a:rPr lang="en-US" sz="2800" dirty="0" err="1" smtClean="0">
+              <a:rPr lang="vi-VN" sz="2800" dirty="0" smtClean="0">
                 <a:latin typeface="Times New Roman" panose="02020603050405020304" pitchFamily="18" charset="0"/>
                 <a:cs typeface="Times New Roman" panose="02020603050405020304" pitchFamily="18" charset="0"/>
               </a:rPr>
-              <a:t>Nguyễn</a:t>
-            </a:r>
-            <a:r>
-              <a:rPr lang="en-US" sz="2800" dirty="0" smtClean="0">
-                <a:latin typeface="Times New Roman" panose="02020603050405020304" pitchFamily="18" charset="0"/>
-                <a:cs typeface="Times New Roman" panose="02020603050405020304" pitchFamily="18" charset="0"/>
-              </a:rPr>
-              <a:t> Xuân Nam</a:t>
+              <a:t>Nguyễn Xuân Nam</a:t>
             </a:r>
           </a:p>
           <a:p>
@@ -8219,84 +8188,12 @@
               <a:buChar char="•"/>
             </a:pPr>
             <a:r>
-              <a:rPr lang="en-US" sz="2800" dirty="0" err="1" smtClean="0">
+              <a:rPr lang="vi-VN" sz="2800" dirty="0" smtClean="0">
                 <a:latin typeface="Times New Roman" panose="02020603050405020304" pitchFamily="18" charset="0"/>
                 <a:cs typeface="Times New Roman" panose="02020603050405020304" pitchFamily="18" charset="0"/>
               </a:rPr>
-              <a:t>Phùng</a:t>
-            </a:r>
-            <a:r>
-              <a:rPr lang="en-US" sz="2800" dirty="0" smtClean="0">
-                <a:latin typeface="Times New Roman" panose="02020603050405020304" pitchFamily="18" charset="0"/>
-                <a:cs typeface="Times New Roman" panose="02020603050405020304" pitchFamily="18" charset="0"/>
-              </a:rPr>
-              <a:t> </a:t>
-            </a:r>
-            <a:r>
-              <a:rPr lang="en-US" sz="2800" dirty="0" err="1" smtClean="0">
-                <a:latin typeface="Times New Roman" panose="02020603050405020304" pitchFamily="18" charset="0"/>
-                <a:cs typeface="Times New Roman" panose="02020603050405020304" pitchFamily="18" charset="0"/>
-              </a:rPr>
-              <a:t>Nguyên</a:t>
-            </a:r>
-            <a:r>
-              <a:rPr lang="en-US" sz="2800" dirty="0" smtClean="0">
-                <a:latin typeface="Times New Roman" panose="02020603050405020304" pitchFamily="18" charset="0"/>
-                <a:cs typeface="Times New Roman" panose="02020603050405020304" pitchFamily="18" charset="0"/>
-              </a:rPr>
-              <a:t> </a:t>
-            </a:r>
-            <a:r>
-              <a:rPr lang="en-US" sz="2800" dirty="0" err="1" smtClean="0">
-                <a:latin typeface="Times New Roman" panose="02020603050405020304" pitchFamily="18" charset="0"/>
-                <a:cs typeface="Times New Roman" panose="02020603050405020304" pitchFamily="18" charset="0"/>
-              </a:rPr>
-              <a:t>Ngọc</a:t>
-            </a:r>
-            <a:endParaRPr lang="en-US" sz="2800" dirty="0" smtClean="0">
-              <a:latin typeface="Times New Roman" panose="02020603050405020304" pitchFamily="18" charset="0"/>
-              <a:cs typeface="Times New Roman" panose="02020603050405020304" pitchFamily="18" charset="0"/>
-            </a:endParaRPr>
-          </a:p>
-          <a:p>
-            <a:pPr marL="285750" indent="-285750">
-              <a:buFont typeface="Arial" panose="020B0604020202020204" pitchFamily="34" charset="0"/>
-              <a:buChar char="•"/>
-            </a:pPr>
-            <a:endParaRPr lang="en-US" sz="2800" dirty="0">
-              <a:latin typeface="Times New Roman" panose="02020603050405020304" pitchFamily="18" charset="0"/>
-              <a:cs typeface="Times New Roman" panose="02020603050405020304" pitchFamily="18" charset="0"/>
-            </a:endParaRPr>
-          </a:p>
-          <a:p>
-            <a:pPr marL="285750" indent="-285750">
-              <a:buFont typeface="Arial" panose="020B0604020202020204" pitchFamily="34" charset="0"/>
-              <a:buChar char="•"/>
-            </a:pPr>
-            <a:endParaRPr lang="en-US" sz="2800" dirty="0" smtClean="0">
-              <a:latin typeface="Times New Roman" panose="02020603050405020304" pitchFamily="18" charset="0"/>
-              <a:cs typeface="Times New Roman" panose="02020603050405020304" pitchFamily="18" charset="0"/>
-            </a:endParaRPr>
-          </a:p>
-          <a:p>
-            <a:pPr marL="285750" indent="-285750">
-              <a:buFont typeface="Arial" panose="020B0604020202020204" pitchFamily="34" charset="0"/>
-              <a:buChar char="•"/>
-            </a:pPr>
-            <a:endParaRPr lang="en-US" sz="2800" dirty="0">
-              <a:latin typeface="Times New Roman" panose="02020603050405020304" pitchFamily="18" charset="0"/>
-              <a:cs typeface="Times New Roman" panose="02020603050405020304" pitchFamily="18" charset="0"/>
-            </a:endParaRPr>
-          </a:p>
-          <a:p>
-            <a:pPr marL="285750" indent="-285750">
-              <a:buFont typeface="Arial" panose="020B0604020202020204" pitchFamily="34" charset="0"/>
-              <a:buChar char="•"/>
-            </a:pPr>
-            <a:endParaRPr lang="en-US" sz="2800" dirty="0" smtClean="0">
-              <a:latin typeface="Times New Roman" panose="02020603050405020304" pitchFamily="18" charset="0"/>
-              <a:cs typeface="Times New Roman" panose="02020603050405020304" pitchFamily="18" charset="0"/>
-            </a:endParaRPr>
+              <a:t>Phùng Nguyên Ngọc</a:t>
+            </a:r>
           </a:p>
         </p:txBody>
       </p:sp>
@@ -8322,6 +8219,13 @@
       </p:transition>
     </mc:Fallback>
   </mc:AlternateContent>
+  <p:timing>
+    <p:tnLst>
+      <p:par>
+        <p:cTn id="1" dur="indefinite" restart="never" nodeType="tmRoot"/>
+      </p:par>
+    </p:tnLst>
+  </p:timing>
 </p:sld>
 </file>
 
@@ -8393,7 +8297,6 @@
               <a:rPr lang="en-US" sz="2400" cap="none" dirty="0" smtClean="0"/>
               <a:t>Ideas</a:t>
             </a:r>
-            <a:endParaRPr lang="en-US" sz="2400" cap="none" dirty="0" smtClean="0"/>
           </a:p>
           <a:p>
             <a:pPr lvl="1"/>
@@ -9171,8 +9074,8 @@
         </p:nvSpPr>
         <p:spPr>
           <a:xfrm>
-            <a:off x="3567448" y="4713101"/>
-            <a:ext cx="5332614" cy="461665"/>
+            <a:off x="2919451" y="5466136"/>
+            <a:ext cx="6880917" cy="461665"/>
           </a:xfrm>
           <a:prstGeom prst="rect">
             <a:avLst/>
@@ -9180,7 +9083,7 @@
           <a:noFill/>
         </p:spPr>
         <p:txBody>
-          <a:bodyPr wrap="none" rtlCol="0">
+          <a:bodyPr wrap="square" rtlCol="0">
             <a:spAutoFit/>
           </a:bodyPr>
           <a:lstStyle/>
@@ -9217,7 +9120,7 @@
         </p:blipFill>
         <p:spPr>
           <a:xfrm>
-            <a:off x="2515822" y="1610259"/>
+            <a:off x="2515819" y="1999497"/>
             <a:ext cx="7688179" cy="2934136"/>
           </a:xfrm>
           <a:prstGeom prst="rect">
@@ -9286,8 +9189,8 @@
         </p:nvSpPr>
         <p:spPr>
           <a:xfrm>
-            <a:off x="855716" y="-421569"/>
-            <a:ext cx="10364451" cy="1596177"/>
+            <a:off x="685164" y="34911"/>
+            <a:ext cx="10364451" cy="795855"/>
           </a:xfrm>
         </p:spPr>
         <p:txBody>
@@ -9310,8 +9213,8 @@
         </p:nvSpPr>
         <p:spPr>
           <a:xfrm>
-            <a:off x="401373" y="882220"/>
-            <a:ext cx="3993401" cy="461665"/>
+            <a:off x="685164" y="918048"/>
+            <a:ext cx="5509842" cy="461665"/>
           </a:xfrm>
           <a:prstGeom prst="rect">
             <a:avLst/>
@@ -9325,18 +9228,16 @@
           <a:lstStyle/>
           <a:p>
             <a:r>
-              <a:rPr lang="en-US" sz="2400" dirty="0" smtClean="0"/>
-              <a:t>Click </a:t>
-            </a:r>
-            <a:r>
               <a:rPr lang="en-US" sz="2400" dirty="0" smtClean="0">
                 <a:hlinkClick r:id="rId2" action="ppaction://hlinkfile"/>
               </a:rPr>
-              <a:t>here </a:t>
-            </a:r>
-            <a:r>
-              <a:rPr lang="en-US" sz="2400" dirty="0" smtClean="0"/>
-              <a:t>for more information</a:t>
+              <a:t>Click </a:t>
+            </a:r>
+            <a:r>
+              <a:rPr lang="en-US" sz="2400" dirty="0" smtClean="0">
+                <a:hlinkClick r:id="rId2" action="ppaction://hlinkfile"/>
+              </a:rPr>
+              <a:t>here for print-friendly version</a:t>
             </a:r>
             <a:endParaRPr lang="en-US" sz="2400" dirty="0"/>
           </a:p>

</xml_diff>